<commit_message>
consider continuous tau to action_repetition
</commit_message>
<xml_diff>
--- a/draft/nn.pptx
+++ b/draft/nn.pptx
@@ -7,6 +7,7 @@
   <p:sldIdLst>
     <p:sldId id="256" r:id="rId2"/>
     <p:sldId id="257" r:id="rId3"/>
+    <p:sldId id="258" r:id="rId4"/>
   </p:sldIdLst>
   <p:sldSz cx="12192000" cy="6858000"/>
   <p:notesSz cx="6858000" cy="9144000"/>
@@ -105,6 +106,11 @@
       </a:defRPr>
     </a:lvl9pPr>
   </p:defaultTextStyle>
+  <p:extLst>
+    <p:ext uri="{EFAFB233-063F-42B5-8137-9DF3F51BA10A}">
+      <p15:sldGuideLst xmlns:p15="http://schemas.microsoft.com/office/powerpoint/2012/main"/>
+    </p:ext>
+  </p:extLst>
 </p:presentation>
 </file>
 
@@ -7072,7 +7078,7 @@
         </p:nvSpPr>
         <p:spPr>
           <a:xfrm>
-            <a:off x="1322173" y="481914"/>
+            <a:off x="207778" y="136996"/>
             <a:ext cx="2262158" cy="369332"/>
           </a:xfrm>
           <a:prstGeom prst="rect">
@@ -7097,6 +7103,812 @@
     <p:extLst>
       <p:ext uri="{BB962C8B-B14F-4D97-AF65-F5344CB8AC3E}">
         <p14:creationId xmlns:p14="http://schemas.microsoft.com/office/powerpoint/2010/main" val="3810634078"/>
+      </p:ext>
+    </p:extLst>
+  </p:cSld>
+  <p:clrMapOvr>
+    <a:masterClrMapping/>
+  </p:clrMapOvr>
+</p:sld>
+</file>
+
+<file path=ppt/slides/slide3.xml><?xml version="1.0" encoding="utf-8"?>
+<p:sld xmlns:a="http://schemas.openxmlformats.org/drawingml/2006/main" xmlns:r="http://schemas.openxmlformats.org/officeDocument/2006/relationships" xmlns:p="http://schemas.openxmlformats.org/presentationml/2006/main">
+  <p:cSld>
+    <p:spTree>
+      <p:nvGrpSpPr>
+        <p:cNvPr id="1" name=""/>
+        <p:cNvGrpSpPr/>
+        <p:nvPr/>
+      </p:nvGrpSpPr>
+      <p:grpSpPr>
+        <a:xfrm>
+          <a:off x="0" y="0"/>
+          <a:ext cx="0" cy="0"/>
+          <a:chOff x="0" y="0"/>
+          <a:chExt cx="0" cy="0"/>
+        </a:xfrm>
+      </p:grpSpPr>
+      <p:sp>
+        <p:nvSpPr>
+          <p:cNvPr id="5" name="正方形/長方形 4">
+            <a:extLst>
+              <a:ext uri="{FF2B5EF4-FFF2-40B4-BE49-F238E27FC236}">
+                <a16:creationId xmlns:a16="http://schemas.microsoft.com/office/drawing/2014/main" id="{BC1ED537-BE11-144B-AC40-D418C00647B2}"/>
+              </a:ext>
+            </a:extLst>
+          </p:cNvPr>
+          <p:cNvSpPr/>
+          <p:nvPr/>
+        </p:nvSpPr>
+        <p:spPr>
+          <a:xfrm>
+            <a:off x="1638795" y="1781299"/>
+            <a:ext cx="1270660" cy="558140"/>
+          </a:xfrm>
+          <a:prstGeom prst="rect">
+            <a:avLst/>
+          </a:prstGeom>
+          <a:noFill/>
+          <a:ln>
+            <a:solidFill>
+              <a:schemeClr val="tx1"/>
+            </a:solidFill>
+          </a:ln>
+        </p:spPr>
+        <p:style>
+          <a:lnRef idx="2">
+            <a:schemeClr val="accent1">
+              <a:shade val="50000"/>
+            </a:schemeClr>
+          </a:lnRef>
+          <a:fillRef idx="1">
+            <a:schemeClr val="accent1"/>
+          </a:fillRef>
+          <a:effectRef idx="0">
+            <a:schemeClr val="accent1"/>
+          </a:effectRef>
+          <a:fontRef idx="minor">
+            <a:schemeClr val="lt1"/>
+          </a:fontRef>
+        </p:style>
+        <p:txBody>
+          <a:bodyPr rtlCol="0" anchor="ctr"/>
+          <a:lstStyle/>
+          <a:p>
+            <a:pPr algn="ctr"/>
+            <a:r>
+              <a:rPr lang="en-US" altLang="ja-JP" b="1" dirty="0">
+                <a:solidFill>
+                  <a:schemeClr val="tx1"/>
+                </a:solidFill>
+              </a:rPr>
+              <a:t>Actuator</a:t>
+            </a:r>
+            <a:endParaRPr kumimoji="1" lang="ja-JP" altLang="en-US" b="1">
+              <a:solidFill>
+                <a:schemeClr val="tx1"/>
+              </a:solidFill>
+            </a:endParaRPr>
+          </a:p>
+        </p:txBody>
+      </p:sp>
+      <p:sp>
+        <p:nvSpPr>
+          <p:cNvPr id="7" name="正方形/長方形 6">
+            <a:extLst>
+              <a:ext uri="{FF2B5EF4-FFF2-40B4-BE49-F238E27FC236}">
+                <a16:creationId xmlns:a16="http://schemas.microsoft.com/office/drawing/2014/main" id="{E3ECD633-67F1-AB42-95A3-100F76320FF7}"/>
+              </a:ext>
+            </a:extLst>
+          </p:cNvPr>
+          <p:cNvSpPr/>
+          <p:nvPr/>
+        </p:nvSpPr>
+        <p:spPr>
+          <a:xfrm>
+            <a:off x="4234821" y="1597881"/>
+            <a:ext cx="1270660" cy="924976"/>
+          </a:xfrm>
+          <a:prstGeom prst="rect">
+            <a:avLst/>
+          </a:prstGeom>
+          <a:noFill/>
+          <a:ln>
+            <a:solidFill>
+              <a:schemeClr val="tx1"/>
+            </a:solidFill>
+          </a:ln>
+        </p:spPr>
+        <p:style>
+          <a:lnRef idx="2">
+            <a:schemeClr val="accent1">
+              <a:shade val="50000"/>
+            </a:schemeClr>
+          </a:lnRef>
+          <a:fillRef idx="1">
+            <a:schemeClr val="accent1"/>
+          </a:fillRef>
+          <a:effectRef idx="0">
+            <a:schemeClr val="accent1"/>
+          </a:effectRef>
+          <a:fontRef idx="minor">
+            <a:schemeClr val="lt1"/>
+          </a:fontRef>
+        </p:style>
+        <p:txBody>
+          <a:bodyPr rtlCol="0" anchor="ctr"/>
+          <a:lstStyle/>
+          <a:p>
+            <a:pPr algn="ctr"/>
+            <a:r>
+              <a:rPr lang="en-US" altLang="ja-JP" b="1" dirty="0">
+                <a:solidFill>
+                  <a:schemeClr val="tx1"/>
+                </a:solidFill>
+              </a:rPr>
+              <a:t>System</a:t>
+            </a:r>
+            <a:endParaRPr kumimoji="1" lang="ja-JP" altLang="en-US" b="1">
+              <a:solidFill>
+                <a:schemeClr val="tx1"/>
+              </a:solidFill>
+            </a:endParaRPr>
+          </a:p>
+        </p:txBody>
+      </p:sp>
+      <p:sp>
+        <p:nvSpPr>
+          <p:cNvPr id="8" name="正方形/長方形 7">
+            <a:extLst>
+              <a:ext uri="{FF2B5EF4-FFF2-40B4-BE49-F238E27FC236}">
+                <a16:creationId xmlns:a16="http://schemas.microsoft.com/office/drawing/2014/main" id="{00503ABB-FBDC-8C45-801A-98038263AB58}"/>
+              </a:ext>
+            </a:extLst>
+          </p:cNvPr>
+          <p:cNvSpPr/>
+          <p:nvPr/>
+        </p:nvSpPr>
+        <p:spPr>
+          <a:xfrm>
+            <a:off x="6830847" y="1781299"/>
+            <a:ext cx="1270660" cy="558140"/>
+          </a:xfrm>
+          <a:prstGeom prst="rect">
+            <a:avLst/>
+          </a:prstGeom>
+          <a:noFill/>
+          <a:ln>
+            <a:solidFill>
+              <a:schemeClr val="tx1"/>
+            </a:solidFill>
+          </a:ln>
+        </p:spPr>
+        <p:style>
+          <a:lnRef idx="2">
+            <a:schemeClr val="accent1">
+              <a:shade val="50000"/>
+            </a:schemeClr>
+          </a:lnRef>
+          <a:fillRef idx="1">
+            <a:schemeClr val="accent1"/>
+          </a:fillRef>
+          <a:effectRef idx="0">
+            <a:schemeClr val="accent1"/>
+          </a:effectRef>
+          <a:fontRef idx="minor">
+            <a:schemeClr val="lt1"/>
+          </a:fontRef>
+        </p:style>
+        <p:txBody>
+          <a:bodyPr rtlCol="0" anchor="ctr"/>
+          <a:lstStyle/>
+          <a:p>
+            <a:pPr algn="ctr"/>
+            <a:r>
+              <a:rPr lang="en-US" altLang="ja-JP" b="1" dirty="0">
+                <a:solidFill>
+                  <a:schemeClr val="tx1"/>
+                </a:solidFill>
+              </a:rPr>
+              <a:t>Sensor</a:t>
+            </a:r>
+            <a:endParaRPr kumimoji="1" lang="ja-JP" altLang="en-US" b="1">
+              <a:solidFill>
+                <a:schemeClr val="tx1"/>
+              </a:solidFill>
+            </a:endParaRPr>
+          </a:p>
+        </p:txBody>
+      </p:sp>
+      <p:sp>
+        <p:nvSpPr>
+          <p:cNvPr id="9" name="正方形/長方形 8">
+            <a:extLst>
+              <a:ext uri="{FF2B5EF4-FFF2-40B4-BE49-F238E27FC236}">
+                <a16:creationId xmlns:a16="http://schemas.microsoft.com/office/drawing/2014/main" id="{44D1105C-9786-E741-BA83-9A2795C04F0E}"/>
+              </a:ext>
+            </a:extLst>
+          </p:cNvPr>
+          <p:cNvSpPr/>
+          <p:nvPr/>
+        </p:nvSpPr>
+        <p:spPr>
+          <a:xfrm>
+            <a:off x="6096000" y="3429000"/>
+            <a:ext cx="1270660" cy="558140"/>
+          </a:xfrm>
+          <a:prstGeom prst="rect">
+            <a:avLst/>
+          </a:prstGeom>
+          <a:noFill/>
+          <a:ln>
+            <a:solidFill>
+              <a:schemeClr val="tx1"/>
+            </a:solidFill>
+          </a:ln>
+        </p:spPr>
+        <p:style>
+          <a:lnRef idx="2">
+            <a:schemeClr val="accent1">
+              <a:shade val="50000"/>
+            </a:schemeClr>
+          </a:lnRef>
+          <a:fillRef idx="1">
+            <a:schemeClr val="accent1"/>
+          </a:fillRef>
+          <a:effectRef idx="0">
+            <a:schemeClr val="accent1"/>
+          </a:effectRef>
+          <a:fontRef idx="minor">
+            <a:schemeClr val="lt1"/>
+          </a:fontRef>
+        </p:style>
+        <p:txBody>
+          <a:bodyPr rtlCol="0" anchor="ctr"/>
+          <a:lstStyle/>
+          <a:p>
+            <a:pPr algn="ctr"/>
+            <a:r>
+              <a:rPr lang="en-US" altLang="ja-JP" b="1" dirty="0">
+                <a:solidFill>
+                  <a:schemeClr val="tx1"/>
+                </a:solidFill>
+              </a:rPr>
+              <a:t>Agent</a:t>
+            </a:r>
+            <a:endParaRPr kumimoji="1" lang="ja-JP" altLang="en-US" b="1">
+              <a:solidFill>
+                <a:schemeClr val="tx1"/>
+              </a:solidFill>
+            </a:endParaRPr>
+          </a:p>
+        </p:txBody>
+      </p:sp>
+      <p:sp>
+        <p:nvSpPr>
+          <p:cNvPr id="10" name="正方形/長方形 9">
+            <a:extLst>
+              <a:ext uri="{FF2B5EF4-FFF2-40B4-BE49-F238E27FC236}">
+                <a16:creationId xmlns:a16="http://schemas.microsoft.com/office/drawing/2014/main" id="{A4CA9CC0-8DDE-BF40-A3BD-44B36A6254CC}"/>
+              </a:ext>
+            </a:extLst>
+          </p:cNvPr>
+          <p:cNvSpPr/>
+          <p:nvPr/>
+        </p:nvSpPr>
+        <p:spPr>
+          <a:xfrm>
+            <a:off x="2274125" y="3429000"/>
+            <a:ext cx="1270660" cy="558140"/>
+          </a:xfrm>
+          <a:prstGeom prst="rect">
+            <a:avLst/>
+          </a:prstGeom>
+          <a:noFill/>
+          <a:ln>
+            <a:solidFill>
+              <a:schemeClr val="tx1"/>
+            </a:solidFill>
+          </a:ln>
+        </p:spPr>
+        <p:style>
+          <a:lnRef idx="2">
+            <a:schemeClr val="accent1">
+              <a:shade val="50000"/>
+            </a:schemeClr>
+          </a:lnRef>
+          <a:fillRef idx="1">
+            <a:schemeClr val="accent1"/>
+          </a:fillRef>
+          <a:effectRef idx="0">
+            <a:schemeClr val="accent1"/>
+          </a:effectRef>
+          <a:fontRef idx="minor">
+            <a:schemeClr val="lt1"/>
+          </a:fontRef>
+        </p:style>
+        <p:txBody>
+          <a:bodyPr rtlCol="0" anchor="ctr"/>
+          <a:lstStyle/>
+          <a:p>
+            <a:pPr algn="ctr"/>
+            <a:r>
+              <a:rPr kumimoji="1" lang="en-US" altLang="ja-JP" b="1" dirty="0">
+                <a:solidFill>
+                  <a:schemeClr val="tx1"/>
+                </a:solidFill>
+              </a:rPr>
+              <a:t>CBF</a:t>
+            </a:r>
+            <a:endParaRPr kumimoji="1" lang="ja-JP" altLang="en-US" b="1">
+              <a:solidFill>
+                <a:schemeClr val="tx1"/>
+              </a:solidFill>
+            </a:endParaRPr>
+          </a:p>
+        </p:txBody>
+      </p:sp>
+      <p:cxnSp>
+        <p:nvCxnSpPr>
+          <p:cNvPr id="12" name="直線矢印コネクタ 11">
+            <a:extLst>
+              <a:ext uri="{FF2B5EF4-FFF2-40B4-BE49-F238E27FC236}">
+                <a16:creationId xmlns:a16="http://schemas.microsoft.com/office/drawing/2014/main" id="{AF959EA1-CEFD-5141-A7A0-82C8CBC3DCC6}"/>
+              </a:ext>
+            </a:extLst>
+          </p:cNvPr>
+          <p:cNvCxnSpPr>
+            <a:cxnSpLocks/>
+            <a:stCxn id="5" idx="3"/>
+            <a:endCxn id="7" idx="1"/>
+          </p:cNvCxnSpPr>
+          <p:nvPr/>
+        </p:nvCxnSpPr>
+        <p:spPr>
+          <a:xfrm>
+            <a:off x="2909455" y="2060369"/>
+            <a:ext cx="1325366" cy="0"/>
+          </a:xfrm>
+          <a:prstGeom prst="straightConnector1">
+            <a:avLst/>
+          </a:prstGeom>
+          <a:ln w="12700">
+            <a:solidFill>
+              <a:schemeClr val="tx1"/>
+            </a:solidFill>
+            <a:tailEnd type="triangle"/>
+          </a:ln>
+        </p:spPr>
+        <p:style>
+          <a:lnRef idx="1">
+            <a:schemeClr val="accent1"/>
+          </a:lnRef>
+          <a:fillRef idx="0">
+            <a:schemeClr val="accent1"/>
+          </a:fillRef>
+          <a:effectRef idx="0">
+            <a:schemeClr val="accent1"/>
+          </a:effectRef>
+          <a:fontRef idx="minor">
+            <a:schemeClr val="tx1"/>
+          </a:fontRef>
+        </p:style>
+      </p:cxnSp>
+      <p:cxnSp>
+        <p:nvCxnSpPr>
+          <p:cNvPr id="15" name="直線矢印コネクタ 14">
+            <a:extLst>
+              <a:ext uri="{FF2B5EF4-FFF2-40B4-BE49-F238E27FC236}">
+                <a16:creationId xmlns:a16="http://schemas.microsoft.com/office/drawing/2014/main" id="{E562E6AE-C068-A041-9723-58179E3883E5}"/>
+              </a:ext>
+            </a:extLst>
+          </p:cNvPr>
+          <p:cNvCxnSpPr>
+            <a:cxnSpLocks/>
+          </p:cNvCxnSpPr>
+          <p:nvPr/>
+        </p:nvCxnSpPr>
+        <p:spPr>
+          <a:xfrm>
+            <a:off x="5505481" y="2060369"/>
+            <a:ext cx="1325366" cy="0"/>
+          </a:xfrm>
+          <a:prstGeom prst="straightConnector1">
+            <a:avLst/>
+          </a:prstGeom>
+          <a:ln w="12700">
+            <a:solidFill>
+              <a:schemeClr val="tx1"/>
+            </a:solidFill>
+            <a:tailEnd type="triangle"/>
+          </a:ln>
+        </p:spPr>
+        <p:style>
+          <a:lnRef idx="1">
+            <a:schemeClr val="accent1"/>
+          </a:lnRef>
+          <a:fillRef idx="0">
+            <a:schemeClr val="accent1"/>
+          </a:fillRef>
+          <a:effectRef idx="0">
+            <a:schemeClr val="accent1"/>
+          </a:effectRef>
+          <a:fontRef idx="minor">
+            <a:schemeClr val="tx1"/>
+          </a:fontRef>
+        </p:style>
+      </p:cxnSp>
+      <p:cxnSp>
+        <p:nvCxnSpPr>
+          <p:cNvPr id="16" name="直線矢印コネクタ 15">
+            <a:extLst>
+              <a:ext uri="{FF2B5EF4-FFF2-40B4-BE49-F238E27FC236}">
+                <a16:creationId xmlns:a16="http://schemas.microsoft.com/office/drawing/2014/main" id="{5F3E54D5-CFF0-9641-B0A5-BE33AE7BDCAD}"/>
+              </a:ext>
+            </a:extLst>
+          </p:cNvPr>
+          <p:cNvCxnSpPr>
+            <a:cxnSpLocks/>
+            <a:stCxn id="8" idx="2"/>
+            <a:endCxn id="9" idx="0"/>
+          </p:cNvCxnSpPr>
+          <p:nvPr/>
+        </p:nvCxnSpPr>
+        <p:spPr>
+          <a:xfrm flipH="1">
+            <a:off x="6731330" y="2339439"/>
+            <a:ext cx="734847" cy="1089561"/>
+          </a:xfrm>
+          <a:prstGeom prst="straightConnector1">
+            <a:avLst/>
+          </a:prstGeom>
+          <a:ln w="12700">
+            <a:solidFill>
+              <a:schemeClr val="tx1"/>
+            </a:solidFill>
+            <a:tailEnd type="triangle"/>
+          </a:ln>
+        </p:spPr>
+        <p:style>
+          <a:lnRef idx="1">
+            <a:schemeClr val="accent1"/>
+          </a:lnRef>
+          <a:fillRef idx="0">
+            <a:schemeClr val="accent1"/>
+          </a:fillRef>
+          <a:effectRef idx="0">
+            <a:schemeClr val="accent1"/>
+          </a:effectRef>
+          <a:fontRef idx="minor">
+            <a:schemeClr val="tx1"/>
+          </a:fontRef>
+        </p:style>
+      </p:cxnSp>
+      <p:cxnSp>
+        <p:nvCxnSpPr>
+          <p:cNvPr id="19" name="直線矢印コネクタ 18">
+            <a:extLst>
+              <a:ext uri="{FF2B5EF4-FFF2-40B4-BE49-F238E27FC236}">
+                <a16:creationId xmlns:a16="http://schemas.microsoft.com/office/drawing/2014/main" id="{831F98EE-6401-F847-A93C-8BF569E64418}"/>
+              </a:ext>
+            </a:extLst>
+          </p:cNvPr>
+          <p:cNvCxnSpPr>
+            <a:cxnSpLocks/>
+            <a:stCxn id="9" idx="1"/>
+          </p:cNvCxnSpPr>
+          <p:nvPr/>
+        </p:nvCxnSpPr>
+        <p:spPr>
+          <a:xfrm flipH="1">
+            <a:off x="3495028" y="3708070"/>
+            <a:ext cx="2600972" cy="0"/>
+          </a:xfrm>
+          <a:prstGeom prst="straightConnector1">
+            <a:avLst/>
+          </a:prstGeom>
+          <a:ln w="12700">
+            <a:solidFill>
+              <a:schemeClr val="tx1"/>
+            </a:solidFill>
+            <a:tailEnd type="triangle"/>
+          </a:ln>
+        </p:spPr>
+        <p:style>
+          <a:lnRef idx="1">
+            <a:schemeClr val="accent1"/>
+          </a:lnRef>
+          <a:fillRef idx="0">
+            <a:schemeClr val="accent1"/>
+          </a:fillRef>
+          <a:effectRef idx="0">
+            <a:schemeClr val="accent1"/>
+          </a:effectRef>
+          <a:fontRef idx="minor">
+            <a:schemeClr val="tx1"/>
+          </a:fontRef>
+        </p:style>
+      </p:cxnSp>
+      <p:cxnSp>
+        <p:nvCxnSpPr>
+          <p:cNvPr id="22" name="直線矢印コネクタ 21">
+            <a:extLst>
+              <a:ext uri="{FF2B5EF4-FFF2-40B4-BE49-F238E27FC236}">
+                <a16:creationId xmlns:a16="http://schemas.microsoft.com/office/drawing/2014/main" id="{96C01650-705C-BB4B-BDC2-54D52ED11FDD}"/>
+              </a:ext>
+            </a:extLst>
+          </p:cNvPr>
+          <p:cNvCxnSpPr>
+            <a:cxnSpLocks/>
+            <a:stCxn id="10" idx="0"/>
+            <a:endCxn id="5" idx="2"/>
+          </p:cNvCxnSpPr>
+          <p:nvPr/>
+        </p:nvCxnSpPr>
+        <p:spPr>
+          <a:xfrm flipH="1" flipV="1">
+            <a:off x="2274125" y="2339439"/>
+            <a:ext cx="635330" cy="1089561"/>
+          </a:xfrm>
+          <a:prstGeom prst="straightConnector1">
+            <a:avLst/>
+          </a:prstGeom>
+          <a:ln w="12700">
+            <a:solidFill>
+              <a:schemeClr val="tx1"/>
+            </a:solidFill>
+            <a:tailEnd type="triangle"/>
+          </a:ln>
+        </p:spPr>
+        <p:style>
+          <a:lnRef idx="1">
+            <a:schemeClr val="accent1"/>
+          </a:lnRef>
+          <a:fillRef idx="0">
+            <a:schemeClr val="accent1"/>
+          </a:fillRef>
+          <a:effectRef idx="0">
+            <a:schemeClr val="accent1"/>
+          </a:effectRef>
+          <a:fontRef idx="minor">
+            <a:schemeClr val="tx1"/>
+          </a:fontRef>
+        </p:style>
+      </p:cxnSp>
+      <mc:AlternateContent xmlns:mc="http://schemas.openxmlformats.org/markup-compatibility/2006">
+        <mc:Choice xmlns:a14="http://schemas.microsoft.com/office/drawing/2010/main" Requires="a14">
+          <p:sp>
+            <p:nvSpPr>
+              <p:cNvPr id="25" name="テキスト ボックス 24">
+                <a:extLst>
+                  <a:ext uri="{FF2B5EF4-FFF2-40B4-BE49-F238E27FC236}">
+                    <a16:creationId xmlns:a16="http://schemas.microsoft.com/office/drawing/2014/main" id="{4CB9261D-A522-FA44-9252-D89DD5E06377}"/>
+                  </a:ext>
+                </a:extLst>
+              </p:cNvPr>
+              <p:cNvSpPr txBox="1"/>
+              <p:nvPr/>
+            </p:nvSpPr>
+            <p:spPr>
+              <a:xfrm>
+                <a:off x="4618960" y="3802474"/>
+                <a:ext cx="502382" cy="369332"/>
+              </a:xfrm>
+              <a:prstGeom prst="rect">
+                <a:avLst/>
+              </a:prstGeom>
+              <a:noFill/>
+            </p:spPr>
+            <p:txBody>
+              <a:bodyPr wrap="none" rtlCol="0">
+                <a:spAutoFit/>
+              </a:bodyPr>
+              <a:lstStyle/>
+              <a:p>
+                <a14:m>
+                  <m:oMathPara xmlns:m="http://schemas.openxmlformats.org/officeDocument/2006/math">
+                    <m:oMathParaPr>
+                      <m:jc m:val="centerGroup"/>
+                    </m:oMathParaPr>
+                    <m:oMath xmlns:m="http://schemas.openxmlformats.org/officeDocument/2006/math">
+                      <m:sSub>
+                        <m:sSubPr>
+                          <m:ctrlPr>
+                            <a:rPr kumimoji="1" lang="en-US" altLang="ja-JP" i="1" smtClean="0">
+                              <a:latin typeface="Cambria Math" panose="02040503050406030204" pitchFamily="18" charset="0"/>
+                            </a:rPr>
+                          </m:ctrlPr>
+                        </m:sSubPr>
+                        <m:e>
+                          <m:r>
+                            <a:rPr kumimoji="1" lang="en-US" altLang="ja-JP" b="0" i="1" smtClean="0">
+                              <a:latin typeface="Cambria Math" panose="02040503050406030204" pitchFamily="18" charset="0"/>
+                            </a:rPr>
+                            <m:t>𝑎</m:t>
+                          </m:r>
+                        </m:e>
+                        <m:sub>
+                          <m:r>
+                            <a:rPr kumimoji="1" lang="en-US" altLang="ja-JP" i="1" smtClean="0">
+                              <a:latin typeface="Cambria Math" panose="02040503050406030204" pitchFamily="18" charset="0"/>
+                              <a:ea typeface="Cambria Math" panose="02040503050406030204" pitchFamily="18" charset="0"/>
+                            </a:rPr>
+                            <m:t>𝜋</m:t>
+                          </m:r>
+                        </m:sub>
+                      </m:sSub>
+                    </m:oMath>
+                  </m:oMathPara>
+                </a14:m>
+                <a:endParaRPr kumimoji="1" lang="ja-JP" altLang="en-US"/>
+              </a:p>
+            </p:txBody>
+          </p:sp>
+        </mc:Choice>
+        <mc:Fallback>
+          <p:sp>
+            <p:nvSpPr>
+              <p:cNvPr id="25" name="テキスト ボックス 24">
+                <a:extLst>
+                  <a:ext uri="{FF2B5EF4-FFF2-40B4-BE49-F238E27FC236}">
+                    <a16:creationId xmlns:a16="http://schemas.microsoft.com/office/drawing/2014/main" id="{4CB9261D-A522-FA44-9252-D89DD5E06377}"/>
+                  </a:ext>
+                </a:extLst>
+              </p:cNvPr>
+              <p:cNvSpPr txBox="1">
+                <a:spLocks noRot="1" noChangeAspect="1" noMove="1" noResize="1" noEditPoints="1" noAdjustHandles="1" noChangeArrowheads="1" noChangeShapeType="1" noTextEdit="1"/>
+              </p:cNvSpPr>
+              <p:nvPr/>
+            </p:nvSpPr>
+            <p:spPr>
+              <a:xfrm>
+                <a:off x="4618960" y="3802474"/>
+                <a:ext cx="502382" cy="369332"/>
+              </a:xfrm>
+              <a:prstGeom prst="rect">
+                <a:avLst/>
+              </a:prstGeom>
+              <a:blipFill>
+                <a:blip r:embed="rId2"/>
+                <a:stretch>
+                  <a:fillRect/>
+                </a:stretch>
+              </a:blipFill>
+            </p:spPr>
+            <p:txBody>
+              <a:bodyPr/>
+              <a:lstStyle/>
+              <a:p>
+                <a:r>
+                  <a:rPr lang="ja-JP" altLang="en-US">
+                    <a:noFill/>
+                  </a:rPr>
+                  <a:t> </a:t>
+                </a:r>
+              </a:p>
+            </p:txBody>
+          </p:sp>
+        </mc:Fallback>
+      </mc:AlternateContent>
+      <mc:AlternateContent xmlns:mc="http://schemas.openxmlformats.org/markup-compatibility/2006">
+        <mc:Choice xmlns:a14="http://schemas.microsoft.com/office/drawing/2010/main" Requires="a14">
+          <p:sp>
+            <p:nvSpPr>
+              <p:cNvPr id="26" name="テキスト ボックス 25">
+                <a:extLst>
+                  <a:ext uri="{FF2B5EF4-FFF2-40B4-BE49-F238E27FC236}">
+                    <a16:creationId xmlns:a16="http://schemas.microsoft.com/office/drawing/2014/main" id="{7088E198-B196-8348-8850-50029C8609BF}"/>
+                  </a:ext>
+                </a:extLst>
+              </p:cNvPr>
+              <p:cNvSpPr txBox="1"/>
+              <p:nvPr/>
+            </p:nvSpPr>
+            <p:spPr>
+              <a:xfrm>
+                <a:off x="2658264" y="2712913"/>
+                <a:ext cx="773160" cy="391582"/>
+              </a:xfrm>
+              <a:prstGeom prst="rect">
+                <a:avLst/>
+              </a:prstGeom>
+              <a:noFill/>
+            </p:spPr>
+            <p:txBody>
+              <a:bodyPr wrap="none" rtlCol="0">
+                <a:spAutoFit/>
+              </a:bodyPr>
+              <a:lstStyle/>
+              <a:p>
+                <a14:m>
+                  <m:oMathPara xmlns:m="http://schemas.openxmlformats.org/officeDocument/2006/math">
+                    <m:oMathParaPr>
+                      <m:jc m:val="centerGroup"/>
+                    </m:oMathParaPr>
+                    <m:oMath xmlns:m="http://schemas.openxmlformats.org/officeDocument/2006/math">
+                      <m:sSub>
+                        <m:sSubPr>
+                          <m:ctrlPr>
+                            <a:rPr kumimoji="1" lang="en-US" altLang="ja-JP" i="1" smtClean="0">
+                              <a:latin typeface="Cambria Math" panose="02040503050406030204" pitchFamily="18" charset="0"/>
+                            </a:rPr>
+                          </m:ctrlPr>
+                        </m:sSubPr>
+                        <m:e>
+                          <m:r>
+                            <a:rPr kumimoji="1" lang="en-US" altLang="ja-JP" b="0" i="1" smtClean="0">
+                              <a:latin typeface="Cambria Math" panose="02040503050406030204" pitchFamily="18" charset="0"/>
+                            </a:rPr>
+                            <m:t>𝑎</m:t>
+                          </m:r>
+                        </m:e>
+                        <m:sub>
+                          <m:r>
+                            <a:rPr kumimoji="1" lang="en-US" altLang="ja-JP" b="0" i="1" smtClean="0">
+                              <a:latin typeface="Cambria Math" panose="02040503050406030204" pitchFamily="18" charset="0"/>
+                            </a:rPr>
+                            <m:t>𝑠𝑎𝑓𝑒</m:t>
+                          </m:r>
+                        </m:sub>
+                      </m:sSub>
+                    </m:oMath>
+                  </m:oMathPara>
+                </a14:m>
+                <a:endParaRPr kumimoji="1" lang="ja-JP" altLang="en-US"/>
+              </a:p>
+            </p:txBody>
+          </p:sp>
+        </mc:Choice>
+        <mc:Fallback>
+          <p:sp>
+            <p:nvSpPr>
+              <p:cNvPr id="26" name="テキスト ボックス 25">
+                <a:extLst>
+                  <a:ext uri="{FF2B5EF4-FFF2-40B4-BE49-F238E27FC236}">
+                    <a16:creationId xmlns:a16="http://schemas.microsoft.com/office/drawing/2014/main" id="{7088E198-B196-8348-8850-50029C8609BF}"/>
+                  </a:ext>
+                </a:extLst>
+              </p:cNvPr>
+              <p:cNvSpPr txBox="1">
+                <a:spLocks noRot="1" noChangeAspect="1" noMove="1" noResize="1" noEditPoints="1" noAdjustHandles="1" noChangeArrowheads="1" noChangeShapeType="1" noTextEdit="1"/>
+              </p:cNvSpPr>
+              <p:nvPr/>
+            </p:nvSpPr>
+            <p:spPr>
+              <a:xfrm>
+                <a:off x="2658264" y="2712913"/>
+                <a:ext cx="773160" cy="391582"/>
+              </a:xfrm>
+              <a:prstGeom prst="rect">
+                <a:avLst/>
+              </a:prstGeom>
+              <a:blipFill>
+                <a:blip r:embed="rId3"/>
+                <a:stretch>
+                  <a:fillRect b="-9677"/>
+                </a:stretch>
+              </a:blipFill>
+            </p:spPr>
+            <p:txBody>
+              <a:bodyPr/>
+              <a:lstStyle/>
+              <a:p>
+                <a:r>
+                  <a:rPr lang="ja-JP" altLang="en-US">
+                    <a:noFill/>
+                  </a:rPr>
+                  <a:t> </a:t>
+                </a:r>
+              </a:p>
+            </p:txBody>
+          </p:sp>
+        </mc:Fallback>
+      </mc:AlternateContent>
+    </p:spTree>
+    <p:extLst>
+      <p:ext uri="{BB962C8B-B14F-4D97-AF65-F5344CB8AC3E}">
+        <p14:creationId xmlns:p14="http://schemas.microsoft.com/office/powerpoint/2010/main" val="736331230"/>
       </p:ext>
     </p:extLst>
   </p:cSld>

</xml_diff>